<commit_message>
update year discussion slides after team call
</commit_message>
<xml_diff>
--- a/data/analysis/year_missing_data_approach.pptx
+++ b/data/analysis/year_missing_data_approach.pptx
@@ -10,8 +10,9 @@
     <p:sldId id="257" r:id="rId4"/>
     <p:sldId id="260" r:id="rId5"/>
     <p:sldId id="259" r:id="rId6"/>
-    <p:sldId id="261" r:id="rId7"/>
-    <p:sldId id="262" r:id="rId8"/>
+    <p:sldId id="263" r:id="rId7"/>
+    <p:sldId id="261" r:id="rId8"/>
+    <p:sldId id="262" r:id="rId9"/>
   </p:sldIdLst>
   <p:sldSz cx="12192000" cy="6858000"/>
   <p:notesSz cx="6858000" cy="9144000"/>
@@ -110,6 +111,11 @@
       </a:defRPr>
     </a:lvl9pPr>
   </p:defaultTextStyle>
+  <p:extLst>
+    <p:ext uri="{EFAFB233-063F-42B5-8137-9DF3F51BA10A}">
+      <p15:sldGuideLst xmlns:p15="http://schemas.microsoft.com/office/powerpoint/2012/main"/>
+    </p:ext>
+  </p:extLst>
 </p:presentation>
 </file>
 
@@ -244,7 +250,7 @@
           <a:p>
             <a:fld id="{06487141-35CD-4F46-B19F-74CA38AC7B82}" type="datetimeFigureOut">
               <a:rPr lang="nl-BE" smtClean="0"/>
-              <a:t>4/05/2024</a:t>
+              <a:t>9/05/2024</a:t>
             </a:fld>
             <a:endParaRPr lang="nl-BE"/>
           </a:p>
@@ -414,7 +420,7 @@
           <a:p>
             <a:fld id="{06487141-35CD-4F46-B19F-74CA38AC7B82}" type="datetimeFigureOut">
               <a:rPr lang="nl-BE" smtClean="0"/>
-              <a:t>4/05/2024</a:t>
+              <a:t>9/05/2024</a:t>
             </a:fld>
             <a:endParaRPr lang="nl-BE"/>
           </a:p>
@@ -594,7 +600,7 @@
           <a:p>
             <a:fld id="{06487141-35CD-4F46-B19F-74CA38AC7B82}" type="datetimeFigureOut">
               <a:rPr lang="nl-BE" smtClean="0"/>
-              <a:t>4/05/2024</a:t>
+              <a:t>9/05/2024</a:t>
             </a:fld>
             <a:endParaRPr lang="nl-BE"/>
           </a:p>
@@ -764,7 +770,7 @@
           <a:p>
             <a:fld id="{06487141-35CD-4F46-B19F-74CA38AC7B82}" type="datetimeFigureOut">
               <a:rPr lang="nl-BE" smtClean="0"/>
-              <a:t>4/05/2024</a:t>
+              <a:t>9/05/2024</a:t>
             </a:fld>
             <a:endParaRPr lang="nl-BE"/>
           </a:p>
@@ -1010,7 +1016,7 @@
           <a:p>
             <a:fld id="{06487141-35CD-4F46-B19F-74CA38AC7B82}" type="datetimeFigureOut">
               <a:rPr lang="nl-BE" smtClean="0"/>
-              <a:t>4/05/2024</a:t>
+              <a:t>9/05/2024</a:t>
             </a:fld>
             <a:endParaRPr lang="nl-BE"/>
           </a:p>
@@ -1242,7 +1248,7 @@
           <a:p>
             <a:fld id="{06487141-35CD-4F46-B19F-74CA38AC7B82}" type="datetimeFigureOut">
               <a:rPr lang="nl-BE" smtClean="0"/>
-              <a:t>4/05/2024</a:t>
+              <a:t>9/05/2024</a:t>
             </a:fld>
             <a:endParaRPr lang="nl-BE"/>
           </a:p>
@@ -1609,7 +1615,7 @@
           <a:p>
             <a:fld id="{06487141-35CD-4F46-B19F-74CA38AC7B82}" type="datetimeFigureOut">
               <a:rPr lang="nl-BE" smtClean="0"/>
-              <a:t>4/05/2024</a:t>
+              <a:t>9/05/2024</a:t>
             </a:fld>
             <a:endParaRPr lang="nl-BE"/>
           </a:p>
@@ -1727,7 +1733,7 @@
           <a:p>
             <a:fld id="{06487141-35CD-4F46-B19F-74CA38AC7B82}" type="datetimeFigureOut">
               <a:rPr lang="nl-BE" smtClean="0"/>
-              <a:t>4/05/2024</a:t>
+              <a:t>9/05/2024</a:t>
             </a:fld>
             <a:endParaRPr lang="nl-BE"/>
           </a:p>
@@ -1822,7 +1828,7 @@
           <a:p>
             <a:fld id="{06487141-35CD-4F46-B19F-74CA38AC7B82}" type="datetimeFigureOut">
               <a:rPr lang="nl-BE" smtClean="0"/>
-              <a:t>4/05/2024</a:t>
+              <a:t>9/05/2024</a:t>
             </a:fld>
             <a:endParaRPr lang="nl-BE"/>
           </a:p>
@@ -2099,7 +2105,7 @@
           <a:p>
             <a:fld id="{06487141-35CD-4F46-B19F-74CA38AC7B82}" type="datetimeFigureOut">
               <a:rPr lang="nl-BE" smtClean="0"/>
-              <a:t>4/05/2024</a:t>
+              <a:t>9/05/2024</a:t>
             </a:fld>
             <a:endParaRPr lang="nl-BE"/>
           </a:p>
@@ -2352,7 +2358,7 @@
           <a:p>
             <a:fld id="{06487141-35CD-4F46-B19F-74CA38AC7B82}" type="datetimeFigureOut">
               <a:rPr lang="nl-BE" smtClean="0"/>
-              <a:t>4/05/2024</a:t>
+              <a:t>9/05/2024</a:t>
             </a:fld>
             <a:endParaRPr lang="nl-BE"/>
           </a:p>
@@ -2565,7 +2571,7 @@
           <a:p>
             <a:fld id="{06487141-35CD-4F46-B19F-74CA38AC7B82}" type="datetimeFigureOut">
               <a:rPr lang="nl-BE" smtClean="0"/>
-              <a:t>4/05/2024</a:t>
+              <a:t>9/05/2024</a:t>
             </a:fld>
             <a:endParaRPr lang="nl-BE"/>
           </a:p>
@@ -4248,7 +4254,7 @@
             <p:ph idx="1"/>
             <p:extLst>
               <p:ext uri="{D42A27DB-BD31-4B8C-83A1-F6EECF244321}">
-                <p14:modId xmlns:p14="http://schemas.microsoft.com/office/powerpoint/2010/main" val="4061627905"/>
+                <p14:modId xmlns:p14="http://schemas.microsoft.com/office/powerpoint/2010/main" val="3589207893"/>
               </p:ext>
             </p:extLst>
           </p:nvPr>
@@ -4707,18 +4713,7 @@
                           <a:ea typeface="+mn-ea"/>
                           <a:cs typeface="+mn-cs"/>
                         </a:rPr>
-                        <a:t>2025</a:t>
-                      </a:r>
-                      <a:r>
-                        <a:rPr lang="en-BE" sz="1800" b="1" kern="1200" dirty="0" smtClean="0">
-                          <a:solidFill>
-                            <a:srgbClr val="00B050"/>
-                          </a:solidFill>
-                          <a:latin typeface="+mn-lt"/>
-                          <a:ea typeface="+mn-ea"/>
-                          <a:cs typeface="+mn-cs"/>
-                        </a:rPr>
-                        <a:t>(*3)</a:t>
+                        <a:t>2025(*3)</a:t>
                       </a:r>
                       <a:endParaRPr lang="nl-BE" sz="1800" b="1" kern="1200" dirty="0">
                         <a:solidFill>
@@ -4917,7 +4912,31 @@
                             <a:srgbClr val="00B050"/>
                           </a:solidFill>
                         </a:rPr>
-                        <a:t>Consider them retired in 2023</a:t>
+                        <a:t>Consider them </a:t>
+                      </a:r>
+                      <a:r>
+                        <a:rPr lang="en-BE" b="1" dirty="0" smtClean="0">
+                          <a:solidFill>
+                            <a:srgbClr val="00B050"/>
+                          </a:solidFill>
+                        </a:rPr>
+                        <a:t>commissioned </a:t>
+                      </a:r>
+                      <a:r>
+                        <a:rPr lang="en-BE" b="1" dirty="0" smtClean="0">
+                          <a:solidFill>
+                            <a:srgbClr val="00B050"/>
+                          </a:solidFill>
+                        </a:rPr>
+                        <a:t>in </a:t>
+                      </a:r>
+                      <a:r>
+                        <a:rPr lang="en-BE" b="1" dirty="0" smtClean="0">
+                          <a:solidFill>
+                            <a:srgbClr val="00B050"/>
+                          </a:solidFill>
+                        </a:rPr>
+                        <a:t>2025</a:t>
                       </a:r>
                       <a:endParaRPr lang="en-BE" dirty="0" smtClean="0"/>
                     </a:p>
@@ -4974,6 +4993,60 @@
           <a:chExt cx="0" cy="0"/>
         </a:xfrm>
       </p:grpSpPr>
+      <p:pic>
+        <p:nvPicPr>
+          <p:cNvPr id="4" name="Picture 3"/>
+          <p:cNvPicPr>
+            <a:picLocks noChangeAspect="1"/>
+          </p:cNvPicPr>
+          <p:nvPr/>
+        </p:nvPicPr>
+        <p:blipFill>
+          <a:blip r:embed="rId2"/>
+          <a:stretch>
+            <a:fillRect/>
+          </a:stretch>
+        </p:blipFill>
+        <p:spPr>
+          <a:xfrm>
+            <a:off x="174172" y="1782560"/>
+            <a:ext cx="11164388" cy="3658119"/>
+          </a:xfrm>
+          <a:prstGeom prst="rect">
+            <a:avLst/>
+          </a:prstGeom>
+        </p:spPr>
+      </p:pic>
+    </p:spTree>
+    <p:extLst>
+      <p:ext uri="{BB962C8B-B14F-4D97-AF65-F5344CB8AC3E}">
+        <p14:creationId xmlns:p14="http://schemas.microsoft.com/office/powerpoint/2010/main" val="3930554421"/>
+      </p:ext>
+    </p:extLst>
+  </p:cSld>
+  <p:clrMapOvr>
+    <a:masterClrMapping/>
+  </p:clrMapOvr>
+</p:sld>
+</file>
+
+<file path=ppt/slides/slide7.xml><?xml version="1.0" encoding="utf-8"?>
+<p:sld xmlns:a="http://schemas.openxmlformats.org/drawingml/2006/main" xmlns:r="http://schemas.openxmlformats.org/officeDocument/2006/relationships" xmlns:p="http://schemas.openxmlformats.org/presentationml/2006/main">
+  <p:cSld>
+    <p:spTree>
+      <p:nvGrpSpPr>
+        <p:cNvPr id="1" name=""/>
+        <p:cNvGrpSpPr/>
+        <p:nvPr/>
+      </p:nvGrpSpPr>
+      <p:grpSpPr>
+        <a:xfrm>
+          <a:off x="0" y="0"/>
+          <a:ext cx="0" cy="0"/>
+          <a:chOff x="0" y="0"/>
+          <a:chExt cx="0" cy="0"/>
+        </a:xfrm>
+      </p:grpSpPr>
       <p:sp>
         <p:nvSpPr>
           <p:cNvPr id="2" name="Title 1"/>
@@ -5129,7 +5202,7 @@
 </p:sld>
 </file>
 
-<file path=ppt/slides/slide7.xml><?xml version="1.0" encoding="utf-8"?>
+<file path=ppt/slides/slide8.xml><?xml version="1.0" encoding="utf-8"?>
 <p:sld xmlns:a="http://schemas.openxmlformats.org/drawingml/2006/main" xmlns:r="http://schemas.openxmlformats.org/officeDocument/2006/relationships" xmlns:p="http://schemas.openxmlformats.org/presentationml/2006/main">
   <p:cSld>
     <p:spTree>
@@ -5177,8 +5250,8 @@
         </p:nvSpPr>
         <p:spPr>
           <a:xfrm>
-            <a:off x="1567543" y="3405051"/>
-            <a:ext cx="9387840" cy="513806"/>
+            <a:off x="0" y="3405051"/>
+            <a:ext cx="12064753" cy="513806"/>
           </a:xfrm>
           <a:prstGeom prst="rightArrow">
             <a:avLst/>
@@ -5481,7 +5554,11 @@
           <a:prstGeom prst="line">
             <a:avLst/>
           </a:prstGeom>
-          <a:ln w="57150"/>
+          <a:ln w="57150">
+            <a:solidFill>
+              <a:srgbClr val="00B050"/>
+            </a:solidFill>
+          </a:ln>
         </p:spPr>
         <p:style>
           <a:lnRef idx="3">
@@ -5512,7 +5589,11 @@
           <a:prstGeom prst="line">
             <a:avLst/>
           </a:prstGeom>
-          <a:ln w="57150"/>
+          <a:ln w="57150">
+            <a:solidFill>
+              <a:srgbClr val="00B050"/>
+            </a:solidFill>
+          </a:ln>
         </p:spPr>
         <p:style>
           <a:lnRef idx="3">
@@ -5544,6 +5625,9 @@
             <a:avLst/>
           </a:prstGeom>
           <a:ln w="57150">
+            <a:solidFill>
+              <a:srgbClr val="FF0000"/>
+            </a:solidFill>
             <a:prstDash val="dash"/>
           </a:ln>
         </p:spPr>
@@ -5577,6 +5661,9 @@
             <a:avLst/>
           </a:prstGeom>
           <a:ln w="57150">
+            <a:solidFill>
+              <a:srgbClr val="FF0000"/>
+            </a:solidFill>
             <a:prstDash val="dash"/>
           </a:ln>
         </p:spPr>
@@ -5610,6 +5697,9 @@
             <a:avLst/>
           </a:prstGeom>
           <a:ln w="57150">
+            <a:solidFill>
+              <a:srgbClr val="FF0000"/>
+            </a:solidFill>
             <a:prstDash val="dash"/>
           </a:ln>
         </p:spPr>
@@ -5636,13 +5726,16 @@
         </p:nvCxnSpPr>
         <p:spPr>
           <a:xfrm>
-            <a:off x="387531" y="3230880"/>
+            <a:off x="248194" y="3175161"/>
             <a:ext cx="1180012" cy="0"/>
           </a:xfrm>
           <a:prstGeom prst="line">
             <a:avLst/>
           </a:prstGeom>
           <a:ln w="57150">
+            <a:solidFill>
+              <a:srgbClr val="FF0000"/>
+            </a:solidFill>
             <a:prstDash val="dash"/>
           </a:ln>
         </p:spPr>
@@ -5698,6 +5791,167 @@
           <a:p>
             <a:pPr algn="ctr"/>
             <a:endParaRPr lang="nl-BE"/>
+          </a:p>
+        </p:txBody>
+      </p:sp>
+      <p:cxnSp>
+        <p:nvCxnSpPr>
+          <p:cNvPr id="20" name="Straight Connector 19"/>
+          <p:cNvCxnSpPr/>
+          <p:nvPr/>
+        </p:nvCxnSpPr>
+        <p:spPr>
+          <a:xfrm>
+            <a:off x="643885" y="3326674"/>
+            <a:ext cx="2374523" cy="0"/>
+          </a:xfrm>
+          <a:prstGeom prst="line">
+            <a:avLst/>
+          </a:prstGeom>
+          <a:ln w="57150">
+            <a:solidFill>
+              <a:srgbClr val="FF0000"/>
+            </a:solidFill>
+            <a:prstDash val="dash"/>
+          </a:ln>
+        </p:spPr>
+        <p:style>
+          <a:lnRef idx="3">
+            <a:schemeClr val="accent6"/>
+          </a:lnRef>
+          <a:fillRef idx="0">
+            <a:schemeClr val="accent6"/>
+          </a:fillRef>
+          <a:effectRef idx="2">
+            <a:schemeClr val="accent6"/>
+          </a:effectRef>
+          <a:fontRef idx="minor">
+            <a:schemeClr val="tx1"/>
+          </a:fontRef>
+        </p:style>
+      </p:cxnSp>
+      <p:cxnSp>
+        <p:nvCxnSpPr>
+          <p:cNvPr id="21" name="Straight Connector 20"/>
+          <p:cNvCxnSpPr/>
+          <p:nvPr/>
+        </p:nvCxnSpPr>
+        <p:spPr>
+          <a:xfrm>
+            <a:off x="643885" y="3473620"/>
+            <a:ext cx="4063099" cy="6427"/>
+          </a:xfrm>
+          <a:prstGeom prst="line">
+            <a:avLst/>
+          </a:prstGeom>
+          <a:ln w="57150">
+            <a:solidFill>
+              <a:srgbClr val="FF0000"/>
+            </a:solidFill>
+            <a:prstDash val="dash"/>
+          </a:ln>
+        </p:spPr>
+        <p:style>
+          <a:lnRef idx="3">
+            <a:schemeClr val="accent6"/>
+          </a:lnRef>
+          <a:fillRef idx="0">
+            <a:schemeClr val="accent6"/>
+          </a:fillRef>
+          <a:effectRef idx="2">
+            <a:schemeClr val="accent6"/>
+          </a:effectRef>
+          <a:fontRef idx="minor">
+            <a:schemeClr val="tx1"/>
+          </a:fontRef>
+        </p:style>
+      </p:cxnSp>
+      <p:sp>
+        <p:nvSpPr>
+          <p:cNvPr id="12" name="TextBox 11"/>
+          <p:cNvSpPr txBox="1"/>
+          <p:nvPr/>
+        </p:nvSpPr>
+        <p:spPr>
+          <a:xfrm>
+            <a:off x="1060713" y="2491877"/>
+            <a:ext cx="3946716" cy="369332"/>
+          </a:xfrm>
+          <a:prstGeom prst="rect">
+            <a:avLst/>
+          </a:prstGeom>
+          <a:noFill/>
+        </p:spPr>
+        <p:txBody>
+          <a:bodyPr wrap="square" rtlCol="0">
+            <a:spAutoFit/>
+          </a:bodyPr>
+          <a:lstStyle/>
+          <a:p>
+            <a:r>
+              <a:rPr lang="en-BE" dirty="0" smtClean="0"/>
+              <a:t>2010                                                   2020</a:t>
+            </a:r>
+            <a:endParaRPr lang="nl-BE" dirty="0"/>
+          </a:p>
+        </p:txBody>
+      </p:sp>
+      <p:sp>
+        <p:nvSpPr>
+          <p:cNvPr id="22" name="Rectangle 21"/>
+          <p:cNvSpPr/>
+          <p:nvPr/>
+        </p:nvSpPr>
+        <p:spPr>
+          <a:xfrm>
+            <a:off x="337351" y="3997233"/>
+            <a:ext cx="3382393" cy="2607753"/>
+          </a:xfrm>
+          <a:prstGeom prst="rect">
+            <a:avLst/>
+          </a:prstGeom>
+        </p:spPr>
+        <p:style>
+          <a:lnRef idx="2">
+            <a:schemeClr val="accent1">
+              <a:shade val="50000"/>
+            </a:schemeClr>
+          </a:lnRef>
+          <a:fillRef idx="1">
+            <a:schemeClr val="accent1"/>
+          </a:fillRef>
+          <a:effectRef idx="0">
+            <a:schemeClr val="accent1"/>
+          </a:effectRef>
+          <a:fontRef idx="minor">
+            <a:schemeClr val="lt1"/>
+          </a:fontRef>
+        </p:style>
+        <p:txBody>
+          <a:bodyPr rtlCol="0" anchor="ctr"/>
+          <a:lstStyle/>
+          <a:p>
+            <a:pPr algn="ctr"/>
+            <a:r>
+              <a:rPr lang="en-BE" dirty="0" smtClean="0"/>
+              <a:t>we have to add a hover / note to the time slider explaining to the user that it is filtering the units by ‘comissioning date!’</a:t>
+            </a:r>
+          </a:p>
+          <a:p>
+            <a:pPr algn="ctr"/>
+            <a:endParaRPr lang="en-BE" dirty="0"/>
+          </a:p>
+          <a:p>
+            <a:pPr algn="ctr"/>
+            <a:r>
+              <a:rPr lang="en-BE" dirty="0" smtClean="0"/>
+              <a:t>if you want older units as well, you must lower the lower bound of the time window </a:t>
+            </a:r>
+            <a:r>
+              <a:rPr lang="en-BE" smtClean="0"/>
+              <a:t>sliders...</a:t>
+            </a:r>
+            <a:endParaRPr lang="nl-BE" dirty="0"/>
           </a:p>
         </p:txBody>
       </p:sp>

</xml_diff>